<commit_message>
Materials: Fix Bayes slides
</commit_message>
<xml_diff>
--- a/downloads/Chapter8_Bayes_Classifiers_v2_20210223.pptx
+++ b/downloads/Chapter8_Bayes_Classifiers_v2_20210223.pptx
@@ -212,179 +212,6 @@
 
 <file path=ppt/changesInfos/changesInfo1.xml><?xml version="1.0" encoding="utf-8"?>
 <pc:chgInfo xmlns:a="http://schemas.openxmlformats.org/drawingml/2006/main" xmlns:r="http://schemas.openxmlformats.org/officeDocument/2006/relationships" xmlns:ac="http://schemas.microsoft.com/office/drawing/2013/main/command" xmlns:pc="http://schemas.microsoft.com/office/powerpoint/2013/main/command">
-  <pc:docChgLst>
-    <pc:chgData name="Satoru Hayasaka" userId="f5f1b623-9aa9-4923-b86d-8ceaae247420" providerId="ADAL" clId="{0DF94D7F-3A83-40EC-9E65-11069DEA8A4E}"/>
-    <pc:docChg chg="custSel addSld delSld modSld">
-      <pc:chgData name="Satoru Hayasaka" userId="f5f1b623-9aa9-4923-b86d-8ceaae247420" providerId="ADAL" clId="{0DF94D7F-3A83-40EC-9E65-11069DEA8A4E}" dt="2020-10-27T03:13:54.857" v="234" actId="2696"/>
-      <pc:docMkLst>
-        <pc:docMk/>
-      </pc:docMkLst>
-      <pc:sldChg chg="addSp delSp modSp mod">
-        <pc:chgData name="Satoru Hayasaka" userId="f5f1b623-9aa9-4923-b86d-8ceaae247420" providerId="ADAL" clId="{0DF94D7F-3A83-40EC-9E65-11069DEA8A4E}" dt="2020-10-27T03:09:44.285" v="156" actId="20577"/>
-        <pc:sldMkLst>
-          <pc:docMk/>
-          <pc:sldMk cId="2074309380" sldId="264"/>
-        </pc:sldMkLst>
-        <pc:spChg chg="mod">
-          <ac:chgData name="Satoru Hayasaka" userId="f5f1b623-9aa9-4923-b86d-8ceaae247420" providerId="ADAL" clId="{0DF94D7F-3A83-40EC-9E65-11069DEA8A4E}" dt="2020-10-27T03:09:44.285" v="156" actId="20577"/>
-          <ac:spMkLst>
-            <pc:docMk/>
-            <pc:sldMk cId="2074309380" sldId="264"/>
-            <ac:spMk id="4" creationId="{3AD08A6C-DCF9-6F49-A80A-91206B1C91E4}"/>
-          </ac:spMkLst>
-        </pc:spChg>
-        <pc:spChg chg="del">
-          <ac:chgData name="Satoru Hayasaka" userId="f5f1b623-9aa9-4923-b86d-8ceaae247420" providerId="ADAL" clId="{0DF94D7F-3A83-40EC-9E65-11069DEA8A4E}" dt="2020-10-27T03:07:57.160" v="1" actId="21"/>
-          <ac:spMkLst>
-            <pc:docMk/>
-            <pc:sldMk cId="2074309380" sldId="264"/>
-            <ac:spMk id="6" creationId="{63EF124C-89F8-4B69-B068-C55DD5EB32DB}"/>
-          </ac:spMkLst>
-        </pc:spChg>
-        <pc:spChg chg="add del mod">
-          <ac:chgData name="Satoru Hayasaka" userId="f5f1b623-9aa9-4923-b86d-8ceaae247420" providerId="ADAL" clId="{0DF94D7F-3A83-40EC-9E65-11069DEA8A4E}" dt="2020-10-27T03:08:13.183" v="29" actId="21"/>
-          <ac:spMkLst>
-            <pc:docMk/>
-            <pc:sldMk cId="2074309380" sldId="264"/>
-            <ac:spMk id="8" creationId="{47FA48BB-C935-45A0-9B5D-C0812EA2CC57}"/>
-          </ac:spMkLst>
-        </pc:spChg>
-      </pc:sldChg>
-      <pc:sldChg chg="addSp delSp modSp mod">
-        <pc:chgData name="Satoru Hayasaka" userId="f5f1b623-9aa9-4923-b86d-8ceaae247420" providerId="ADAL" clId="{0DF94D7F-3A83-40EC-9E65-11069DEA8A4E}" dt="2020-10-27T03:11:28.597" v="203" actId="1076"/>
-        <pc:sldMkLst>
-          <pc:docMk/>
-          <pc:sldMk cId="1664438476" sldId="308"/>
-        </pc:sldMkLst>
-        <pc:spChg chg="mod">
-          <ac:chgData name="Satoru Hayasaka" userId="f5f1b623-9aa9-4923-b86d-8ceaae247420" providerId="ADAL" clId="{0DF94D7F-3A83-40EC-9E65-11069DEA8A4E}" dt="2020-10-27T03:11:08.772" v="197" actId="6549"/>
-          <ac:spMkLst>
-            <pc:docMk/>
-            <pc:sldMk cId="1664438476" sldId="308"/>
-            <ac:spMk id="4" creationId="{BAA891B8-8D10-4D98-88DE-376F0CFF3137}"/>
-          </ac:spMkLst>
-        </pc:spChg>
-        <pc:picChg chg="del">
-          <ac:chgData name="Satoru Hayasaka" userId="f5f1b623-9aa9-4923-b86d-8ceaae247420" providerId="ADAL" clId="{0DF94D7F-3A83-40EC-9E65-11069DEA8A4E}" dt="2020-10-27T03:11:09.775" v="198" actId="478"/>
-          <ac:picMkLst>
-            <pc:docMk/>
-            <pc:sldMk cId="1664438476" sldId="308"/>
-            <ac:picMk id="6" creationId="{F51CA733-28D5-4D36-B0E9-971891825BE0}"/>
-          </ac:picMkLst>
-        </pc:picChg>
-        <pc:picChg chg="del">
-          <ac:chgData name="Satoru Hayasaka" userId="f5f1b623-9aa9-4923-b86d-8ceaae247420" providerId="ADAL" clId="{0DF94D7F-3A83-40EC-9E65-11069DEA8A4E}" dt="2020-10-27T03:11:04.460" v="196" actId="478"/>
-          <ac:picMkLst>
-            <pc:docMk/>
-            <pc:sldMk cId="1664438476" sldId="308"/>
-            <ac:picMk id="7" creationId="{BBDC1F13-620D-4133-8F70-34D231A56226}"/>
-          </ac:picMkLst>
-        </pc:picChg>
-        <pc:picChg chg="add mod">
-          <ac:chgData name="Satoru Hayasaka" userId="f5f1b623-9aa9-4923-b86d-8ceaae247420" providerId="ADAL" clId="{0DF94D7F-3A83-40EC-9E65-11069DEA8A4E}" dt="2020-10-27T03:11:28.597" v="203" actId="1076"/>
-          <ac:picMkLst>
-            <pc:docMk/>
-            <pc:sldMk cId="1664438476" sldId="308"/>
-            <ac:picMk id="9" creationId="{F5330249-AD22-4205-9C28-D0BC24295799}"/>
-          </ac:picMkLst>
-        </pc:picChg>
-      </pc:sldChg>
-      <pc:sldChg chg="del">
-        <pc:chgData name="Satoru Hayasaka" userId="f5f1b623-9aa9-4923-b86d-8ceaae247420" providerId="ADAL" clId="{0DF94D7F-3A83-40EC-9E65-11069DEA8A4E}" dt="2020-10-27T03:07:30.380" v="0" actId="2696"/>
-        <pc:sldMkLst>
-          <pc:docMk/>
-          <pc:sldMk cId="991946292" sldId="309"/>
-        </pc:sldMkLst>
-      </pc:sldChg>
-      <pc:sldChg chg="del">
-        <pc:chgData name="Satoru Hayasaka" userId="f5f1b623-9aa9-4923-b86d-8ceaae247420" providerId="ADAL" clId="{0DF94D7F-3A83-40EC-9E65-11069DEA8A4E}" dt="2020-10-27T03:07:30.380" v="0" actId="2696"/>
-        <pc:sldMkLst>
-          <pc:docMk/>
-          <pc:sldMk cId="1796151040" sldId="315"/>
-        </pc:sldMkLst>
-      </pc:sldChg>
-      <pc:sldChg chg="del">
-        <pc:chgData name="Satoru Hayasaka" userId="f5f1b623-9aa9-4923-b86d-8ceaae247420" providerId="ADAL" clId="{0DF94D7F-3A83-40EC-9E65-11069DEA8A4E}" dt="2020-10-27T03:13:54.857" v="234" actId="2696"/>
-        <pc:sldMkLst>
-          <pc:docMk/>
-          <pc:sldMk cId="2464713812" sldId="336"/>
-        </pc:sldMkLst>
-      </pc:sldChg>
-      <pc:sldChg chg="del">
-        <pc:chgData name="Satoru Hayasaka" userId="f5f1b623-9aa9-4923-b86d-8ceaae247420" providerId="ADAL" clId="{0DF94D7F-3A83-40EC-9E65-11069DEA8A4E}" dt="2020-10-27T03:13:54.857" v="234" actId="2696"/>
-        <pc:sldMkLst>
-          <pc:docMk/>
-          <pc:sldMk cId="2531260209" sldId="337"/>
-        </pc:sldMkLst>
-      </pc:sldChg>
-      <pc:sldChg chg="del">
-        <pc:chgData name="Satoru Hayasaka" userId="f5f1b623-9aa9-4923-b86d-8ceaae247420" providerId="ADAL" clId="{0DF94D7F-3A83-40EC-9E65-11069DEA8A4E}" dt="2020-10-27T03:13:54.857" v="234" actId="2696"/>
-        <pc:sldMkLst>
-          <pc:docMk/>
-          <pc:sldMk cId="3614701152" sldId="338"/>
-        </pc:sldMkLst>
-      </pc:sldChg>
-      <pc:sldChg chg="del">
-        <pc:chgData name="Satoru Hayasaka" userId="f5f1b623-9aa9-4923-b86d-8ceaae247420" providerId="ADAL" clId="{0DF94D7F-3A83-40EC-9E65-11069DEA8A4E}" dt="2020-10-27T03:11:40.932" v="204" actId="2696"/>
-        <pc:sldMkLst>
-          <pc:docMk/>
-          <pc:sldMk cId="2739425914" sldId="987"/>
-        </pc:sldMkLst>
-      </pc:sldChg>
-      <pc:sldChg chg="del">
-        <pc:chgData name="Satoru Hayasaka" userId="f5f1b623-9aa9-4923-b86d-8ceaae247420" providerId="ADAL" clId="{0DF94D7F-3A83-40EC-9E65-11069DEA8A4E}" dt="2020-10-27T03:11:40.932" v="204" actId="2696"/>
-        <pc:sldMkLst>
-          <pc:docMk/>
-          <pc:sldMk cId="3966841829" sldId="988"/>
-        </pc:sldMkLst>
-      </pc:sldChg>
-      <pc:sldChg chg="modSp add mod">
-        <pc:chgData name="Satoru Hayasaka" userId="f5f1b623-9aa9-4923-b86d-8ceaae247420" providerId="ADAL" clId="{0DF94D7F-3A83-40EC-9E65-11069DEA8A4E}" dt="2020-10-27T03:12:26.406" v="211" actId="20577"/>
-        <pc:sldMkLst>
-          <pc:docMk/>
-          <pc:sldMk cId="648956517" sldId="1026"/>
-        </pc:sldMkLst>
-        <pc:spChg chg="mod">
-          <ac:chgData name="Satoru Hayasaka" userId="f5f1b623-9aa9-4923-b86d-8ceaae247420" providerId="ADAL" clId="{0DF94D7F-3A83-40EC-9E65-11069DEA8A4E}" dt="2020-10-27T03:12:26.406" v="211" actId="20577"/>
-          <ac:spMkLst>
-            <pc:docMk/>
-            <pc:sldMk cId="648956517" sldId="1026"/>
-            <ac:spMk id="2" creationId="{08235C44-B014-2D41-BB71-B739784ED08C}"/>
-          </ac:spMkLst>
-        </pc:spChg>
-      </pc:sldChg>
-      <pc:sldChg chg="modSp add mod">
-        <pc:chgData name="Satoru Hayasaka" userId="f5f1b623-9aa9-4923-b86d-8ceaae247420" providerId="ADAL" clId="{0DF94D7F-3A83-40EC-9E65-11069DEA8A4E}" dt="2020-10-27T03:13:22.593" v="217" actId="20577"/>
-        <pc:sldMkLst>
-          <pc:docMk/>
-          <pc:sldMk cId="711760696" sldId="1027"/>
-        </pc:sldMkLst>
-        <pc:spChg chg="mod">
-          <ac:chgData name="Satoru Hayasaka" userId="f5f1b623-9aa9-4923-b86d-8ceaae247420" providerId="ADAL" clId="{0DF94D7F-3A83-40EC-9E65-11069DEA8A4E}" dt="2020-10-27T03:13:22.593" v="217" actId="20577"/>
-          <ac:spMkLst>
-            <pc:docMk/>
-            <pc:sldMk cId="711760696" sldId="1027"/>
-            <ac:spMk id="2" creationId="{08235C44-B014-2D41-BB71-B739784ED08C}"/>
-          </ac:spMkLst>
-        </pc:spChg>
-      </pc:sldChg>
-      <pc:sldChg chg="modSp add mod">
-        <pc:chgData name="Satoru Hayasaka" userId="f5f1b623-9aa9-4923-b86d-8ceaae247420" providerId="ADAL" clId="{0DF94D7F-3A83-40EC-9E65-11069DEA8A4E}" dt="2020-10-27T03:13:41.146" v="233" actId="20577"/>
-        <pc:sldMkLst>
-          <pc:docMk/>
-          <pc:sldMk cId="3603240377" sldId="1028"/>
-        </pc:sldMkLst>
-        <pc:spChg chg="mod">
-          <ac:chgData name="Satoru Hayasaka" userId="f5f1b623-9aa9-4923-b86d-8ceaae247420" providerId="ADAL" clId="{0DF94D7F-3A83-40EC-9E65-11069DEA8A4E}" dt="2020-10-27T03:13:41.146" v="233" actId="20577"/>
-          <ac:spMkLst>
-            <pc:docMk/>
-            <pc:sldMk cId="3603240377" sldId="1028"/>
-            <ac:spMk id="2" creationId="{08235C44-B014-2D41-BB71-B739784ED08C}"/>
-          </ac:spMkLst>
-        </pc:spChg>
-      </pc:sldChg>
-    </pc:docChg>
-  </pc:docChgLst>
   <pc:docChgLst>
     <pc:chgData name="Stefan Helfrich" userId="f064987c-175c-4bb3-8a58-232154f220e2" providerId="ADAL" clId="{90E0895B-465A-0649-9847-07436D0DE5D9}"/>
     <pc:docChg chg="custSel modSld">
@@ -687,21 +514,180 @@
       </pc:sldChg>
     </pc:docChg>
   </pc:docChgLst>
+  <pc:docChgLst>
+    <pc:chgData name="Satoru Hayasaka" userId="f5f1b623-9aa9-4923-b86d-8ceaae247420" providerId="ADAL" clId="{0DF94D7F-3A83-40EC-9E65-11069DEA8A4E}"/>
+    <pc:docChg chg="custSel addSld delSld modSld">
+      <pc:chgData name="Satoru Hayasaka" userId="f5f1b623-9aa9-4923-b86d-8ceaae247420" providerId="ADAL" clId="{0DF94D7F-3A83-40EC-9E65-11069DEA8A4E}" dt="2020-10-27T03:13:54.857" v="234" actId="2696"/>
+      <pc:docMkLst>
+        <pc:docMk/>
+      </pc:docMkLst>
+      <pc:sldChg chg="addSp delSp modSp mod">
+        <pc:chgData name="Satoru Hayasaka" userId="f5f1b623-9aa9-4923-b86d-8ceaae247420" providerId="ADAL" clId="{0DF94D7F-3A83-40EC-9E65-11069DEA8A4E}" dt="2020-10-27T03:09:44.285" v="156" actId="20577"/>
+        <pc:sldMkLst>
+          <pc:docMk/>
+          <pc:sldMk cId="2074309380" sldId="264"/>
+        </pc:sldMkLst>
+        <pc:spChg chg="mod">
+          <ac:chgData name="Satoru Hayasaka" userId="f5f1b623-9aa9-4923-b86d-8ceaae247420" providerId="ADAL" clId="{0DF94D7F-3A83-40EC-9E65-11069DEA8A4E}" dt="2020-10-27T03:09:44.285" v="156" actId="20577"/>
+          <ac:spMkLst>
+            <pc:docMk/>
+            <pc:sldMk cId="2074309380" sldId="264"/>
+            <ac:spMk id="4" creationId="{3AD08A6C-DCF9-6F49-A80A-91206B1C91E4}"/>
+          </ac:spMkLst>
+        </pc:spChg>
+        <pc:spChg chg="del">
+          <ac:chgData name="Satoru Hayasaka" userId="f5f1b623-9aa9-4923-b86d-8ceaae247420" providerId="ADAL" clId="{0DF94D7F-3A83-40EC-9E65-11069DEA8A4E}" dt="2020-10-27T03:07:57.160" v="1" actId="21"/>
+          <ac:spMkLst>
+            <pc:docMk/>
+            <pc:sldMk cId="2074309380" sldId="264"/>
+            <ac:spMk id="6" creationId="{63EF124C-89F8-4B69-B068-C55DD5EB32DB}"/>
+          </ac:spMkLst>
+        </pc:spChg>
+        <pc:spChg chg="add del mod">
+          <ac:chgData name="Satoru Hayasaka" userId="f5f1b623-9aa9-4923-b86d-8ceaae247420" providerId="ADAL" clId="{0DF94D7F-3A83-40EC-9E65-11069DEA8A4E}" dt="2020-10-27T03:08:13.183" v="29" actId="21"/>
+          <ac:spMkLst>
+            <pc:docMk/>
+            <pc:sldMk cId="2074309380" sldId="264"/>
+            <ac:spMk id="8" creationId="{47FA48BB-C935-45A0-9B5D-C0812EA2CC57}"/>
+          </ac:spMkLst>
+        </pc:spChg>
+      </pc:sldChg>
+      <pc:sldChg chg="addSp delSp modSp mod">
+        <pc:chgData name="Satoru Hayasaka" userId="f5f1b623-9aa9-4923-b86d-8ceaae247420" providerId="ADAL" clId="{0DF94D7F-3A83-40EC-9E65-11069DEA8A4E}" dt="2020-10-27T03:11:28.597" v="203" actId="1076"/>
+        <pc:sldMkLst>
+          <pc:docMk/>
+          <pc:sldMk cId="1664438476" sldId="308"/>
+        </pc:sldMkLst>
+        <pc:spChg chg="mod">
+          <ac:chgData name="Satoru Hayasaka" userId="f5f1b623-9aa9-4923-b86d-8ceaae247420" providerId="ADAL" clId="{0DF94D7F-3A83-40EC-9E65-11069DEA8A4E}" dt="2020-10-27T03:11:08.772" v="197" actId="6549"/>
+          <ac:spMkLst>
+            <pc:docMk/>
+            <pc:sldMk cId="1664438476" sldId="308"/>
+            <ac:spMk id="4" creationId="{BAA891B8-8D10-4D98-88DE-376F0CFF3137}"/>
+          </ac:spMkLst>
+        </pc:spChg>
+        <pc:picChg chg="del">
+          <ac:chgData name="Satoru Hayasaka" userId="f5f1b623-9aa9-4923-b86d-8ceaae247420" providerId="ADAL" clId="{0DF94D7F-3A83-40EC-9E65-11069DEA8A4E}" dt="2020-10-27T03:11:09.775" v="198" actId="478"/>
+          <ac:picMkLst>
+            <pc:docMk/>
+            <pc:sldMk cId="1664438476" sldId="308"/>
+            <ac:picMk id="6" creationId="{F51CA733-28D5-4D36-B0E9-971891825BE0}"/>
+          </ac:picMkLst>
+        </pc:picChg>
+        <pc:picChg chg="del">
+          <ac:chgData name="Satoru Hayasaka" userId="f5f1b623-9aa9-4923-b86d-8ceaae247420" providerId="ADAL" clId="{0DF94D7F-3A83-40EC-9E65-11069DEA8A4E}" dt="2020-10-27T03:11:04.460" v="196" actId="478"/>
+          <ac:picMkLst>
+            <pc:docMk/>
+            <pc:sldMk cId="1664438476" sldId="308"/>
+            <ac:picMk id="7" creationId="{BBDC1F13-620D-4133-8F70-34D231A56226}"/>
+          </ac:picMkLst>
+        </pc:picChg>
+        <pc:picChg chg="add mod">
+          <ac:chgData name="Satoru Hayasaka" userId="f5f1b623-9aa9-4923-b86d-8ceaae247420" providerId="ADAL" clId="{0DF94D7F-3A83-40EC-9E65-11069DEA8A4E}" dt="2020-10-27T03:11:28.597" v="203" actId="1076"/>
+          <ac:picMkLst>
+            <pc:docMk/>
+            <pc:sldMk cId="1664438476" sldId="308"/>
+            <ac:picMk id="9" creationId="{F5330249-AD22-4205-9C28-D0BC24295799}"/>
+          </ac:picMkLst>
+        </pc:picChg>
+      </pc:sldChg>
+      <pc:sldChg chg="del">
+        <pc:chgData name="Satoru Hayasaka" userId="f5f1b623-9aa9-4923-b86d-8ceaae247420" providerId="ADAL" clId="{0DF94D7F-3A83-40EC-9E65-11069DEA8A4E}" dt="2020-10-27T03:07:30.380" v="0" actId="2696"/>
+        <pc:sldMkLst>
+          <pc:docMk/>
+          <pc:sldMk cId="991946292" sldId="309"/>
+        </pc:sldMkLst>
+      </pc:sldChg>
+      <pc:sldChg chg="del">
+        <pc:chgData name="Satoru Hayasaka" userId="f5f1b623-9aa9-4923-b86d-8ceaae247420" providerId="ADAL" clId="{0DF94D7F-3A83-40EC-9E65-11069DEA8A4E}" dt="2020-10-27T03:07:30.380" v="0" actId="2696"/>
+        <pc:sldMkLst>
+          <pc:docMk/>
+          <pc:sldMk cId="1796151040" sldId="315"/>
+        </pc:sldMkLst>
+      </pc:sldChg>
+      <pc:sldChg chg="del">
+        <pc:chgData name="Satoru Hayasaka" userId="f5f1b623-9aa9-4923-b86d-8ceaae247420" providerId="ADAL" clId="{0DF94D7F-3A83-40EC-9E65-11069DEA8A4E}" dt="2020-10-27T03:13:54.857" v="234" actId="2696"/>
+        <pc:sldMkLst>
+          <pc:docMk/>
+          <pc:sldMk cId="2464713812" sldId="336"/>
+        </pc:sldMkLst>
+      </pc:sldChg>
+      <pc:sldChg chg="del">
+        <pc:chgData name="Satoru Hayasaka" userId="f5f1b623-9aa9-4923-b86d-8ceaae247420" providerId="ADAL" clId="{0DF94D7F-3A83-40EC-9E65-11069DEA8A4E}" dt="2020-10-27T03:13:54.857" v="234" actId="2696"/>
+        <pc:sldMkLst>
+          <pc:docMk/>
+          <pc:sldMk cId="2531260209" sldId="337"/>
+        </pc:sldMkLst>
+      </pc:sldChg>
+      <pc:sldChg chg="del">
+        <pc:chgData name="Satoru Hayasaka" userId="f5f1b623-9aa9-4923-b86d-8ceaae247420" providerId="ADAL" clId="{0DF94D7F-3A83-40EC-9E65-11069DEA8A4E}" dt="2020-10-27T03:13:54.857" v="234" actId="2696"/>
+        <pc:sldMkLst>
+          <pc:docMk/>
+          <pc:sldMk cId="3614701152" sldId="338"/>
+        </pc:sldMkLst>
+      </pc:sldChg>
+      <pc:sldChg chg="del">
+        <pc:chgData name="Satoru Hayasaka" userId="f5f1b623-9aa9-4923-b86d-8ceaae247420" providerId="ADAL" clId="{0DF94D7F-3A83-40EC-9E65-11069DEA8A4E}" dt="2020-10-27T03:11:40.932" v="204" actId="2696"/>
+        <pc:sldMkLst>
+          <pc:docMk/>
+          <pc:sldMk cId="2739425914" sldId="987"/>
+        </pc:sldMkLst>
+      </pc:sldChg>
+      <pc:sldChg chg="del">
+        <pc:chgData name="Satoru Hayasaka" userId="f5f1b623-9aa9-4923-b86d-8ceaae247420" providerId="ADAL" clId="{0DF94D7F-3A83-40EC-9E65-11069DEA8A4E}" dt="2020-10-27T03:11:40.932" v="204" actId="2696"/>
+        <pc:sldMkLst>
+          <pc:docMk/>
+          <pc:sldMk cId="3966841829" sldId="988"/>
+        </pc:sldMkLst>
+      </pc:sldChg>
+      <pc:sldChg chg="modSp add mod">
+        <pc:chgData name="Satoru Hayasaka" userId="f5f1b623-9aa9-4923-b86d-8ceaae247420" providerId="ADAL" clId="{0DF94D7F-3A83-40EC-9E65-11069DEA8A4E}" dt="2020-10-27T03:12:26.406" v="211" actId="20577"/>
+        <pc:sldMkLst>
+          <pc:docMk/>
+          <pc:sldMk cId="648956517" sldId="1026"/>
+        </pc:sldMkLst>
+        <pc:spChg chg="mod">
+          <ac:chgData name="Satoru Hayasaka" userId="f5f1b623-9aa9-4923-b86d-8ceaae247420" providerId="ADAL" clId="{0DF94D7F-3A83-40EC-9E65-11069DEA8A4E}" dt="2020-10-27T03:12:26.406" v="211" actId="20577"/>
+          <ac:spMkLst>
+            <pc:docMk/>
+            <pc:sldMk cId="648956517" sldId="1026"/>
+            <ac:spMk id="2" creationId="{08235C44-B014-2D41-BB71-B739784ED08C}"/>
+          </ac:spMkLst>
+        </pc:spChg>
+      </pc:sldChg>
+      <pc:sldChg chg="modSp add mod">
+        <pc:chgData name="Satoru Hayasaka" userId="f5f1b623-9aa9-4923-b86d-8ceaae247420" providerId="ADAL" clId="{0DF94D7F-3A83-40EC-9E65-11069DEA8A4E}" dt="2020-10-27T03:13:22.593" v="217" actId="20577"/>
+        <pc:sldMkLst>
+          <pc:docMk/>
+          <pc:sldMk cId="711760696" sldId="1027"/>
+        </pc:sldMkLst>
+        <pc:spChg chg="mod">
+          <ac:chgData name="Satoru Hayasaka" userId="f5f1b623-9aa9-4923-b86d-8ceaae247420" providerId="ADAL" clId="{0DF94D7F-3A83-40EC-9E65-11069DEA8A4E}" dt="2020-10-27T03:13:22.593" v="217" actId="20577"/>
+          <ac:spMkLst>
+            <pc:docMk/>
+            <pc:sldMk cId="711760696" sldId="1027"/>
+            <ac:spMk id="2" creationId="{08235C44-B014-2D41-BB71-B739784ED08C}"/>
+          </ac:spMkLst>
+        </pc:spChg>
+      </pc:sldChg>
+      <pc:sldChg chg="modSp add mod">
+        <pc:chgData name="Satoru Hayasaka" userId="f5f1b623-9aa9-4923-b86d-8ceaae247420" providerId="ADAL" clId="{0DF94D7F-3A83-40EC-9E65-11069DEA8A4E}" dt="2020-10-27T03:13:41.146" v="233" actId="20577"/>
+        <pc:sldMkLst>
+          <pc:docMk/>
+          <pc:sldMk cId="3603240377" sldId="1028"/>
+        </pc:sldMkLst>
+        <pc:spChg chg="mod">
+          <ac:chgData name="Satoru Hayasaka" userId="f5f1b623-9aa9-4923-b86d-8ceaae247420" providerId="ADAL" clId="{0DF94D7F-3A83-40EC-9E65-11069DEA8A4E}" dt="2020-10-27T03:13:41.146" v="233" actId="20577"/>
+          <ac:spMkLst>
+            <pc:docMk/>
+            <pc:sldMk cId="3603240377" sldId="1028"/>
+            <ac:spMk id="2" creationId="{08235C44-B014-2D41-BB71-B739784ED08C}"/>
+          </ac:spMkLst>
+        </pc:spChg>
+      </pc:sldChg>
+    </pc:docChg>
+  </pc:docChgLst>
 </pc:chgInfo>
-</file>
-
-<file path=ppt/comments/comment1.xml><?xml version="1.0" encoding="utf-8"?>
-<p:cmLst xmlns:a="http://schemas.openxmlformats.org/drawingml/2006/main" xmlns:r="http://schemas.openxmlformats.org/officeDocument/2006/relationships" xmlns:p="http://schemas.openxmlformats.org/presentationml/2006/main">
-  <p:cm authorId="2" dt="2021-02-15T16:48:13.966" idx="7">
-    <p:pos x="5505" y="567"/>
-    <p:text>check</p:text>
-    <p:extLst>
-      <p:ext uri="{C676402C-5697-4E1C-873F-D02D1690AC5C}">
-        <p15:threadingInfo xmlns:p15="http://schemas.microsoft.com/office/powerpoint/2012/main" timeZoneBias="-60"/>
-      </p:ext>
-    </p:extLst>
-  </p:cm>
-</p:cmLst>
 </file>
 
 <file path=ppt/notesMasters/notesMaster1.xml><?xml version="1.0" encoding="utf-8"?>
@@ -12328,38 +12314,8 @@
           </a:prstGeom>
         </p:spPr>
       </p:pic>
-      <p:pic>
-        <p:nvPicPr>
-          <p:cNvPr id="9" name="Picture 8" descr="Text, letter&#10;&#10;Description automatically generated">
-            <a:extLst>
-              <a:ext uri="{FF2B5EF4-FFF2-40B4-BE49-F238E27FC236}">
-                <a16:creationId xmlns:a16="http://schemas.microsoft.com/office/drawing/2014/main" id="{31DF1BF0-2129-4BE1-B3C8-0BF82D08F3F5}"/>
-              </a:ext>
-            </a:extLst>
-          </p:cNvPr>
-          <p:cNvPicPr>
-            <a:picLocks noChangeAspect="1"/>
-          </p:cNvPicPr>
-          <p:nvPr/>
-        </p:nvPicPr>
-        <p:blipFill>
-          <a:blip r:embed="rId4"/>
-          <a:stretch>
-            <a:fillRect/>
-          </a:stretch>
-        </p:blipFill>
-        <p:spPr>
-          <a:xfrm>
-            <a:off x="7519224" y="2924001"/>
-            <a:ext cx="4395614" cy="1154210"/>
-          </a:xfrm>
-          <a:prstGeom prst="rect">
-            <a:avLst/>
-          </a:prstGeom>
-        </p:spPr>
-      </p:pic>
-      <mc:AlternateContent xmlns:mc="http://schemas.openxmlformats.org/markup-compatibility/2006">
-        <mc:Choice xmlns:a14="http://schemas.microsoft.com/office/drawing/2010/main" Requires="a14">
+      <mc:AlternateContent xmlns:mc="http://schemas.openxmlformats.org/markup-compatibility/2006" xmlns:a14="http://schemas.microsoft.com/office/drawing/2010/main">
+        <mc:Choice Requires="a14">
           <p:sp>
             <p:nvSpPr>
               <p:cNvPr id="6" name="TextBox 5"/>
@@ -13469,7 +13425,7 @@
             </p:txBody>
           </p:sp>
         </mc:Choice>
-        <mc:Fallback>
+        <mc:Fallback xmlns="">
           <p:sp>
             <p:nvSpPr>
               <p:cNvPr id="6" name="TextBox 5"/>
@@ -16827,8 +16783,8 @@
           </p:sp>
         </mc:Fallback>
       </mc:AlternateContent>
-      <mc:AlternateContent xmlns:mc="http://schemas.openxmlformats.org/markup-compatibility/2006">
-        <mc:Choice xmlns:a14="http://schemas.microsoft.com/office/drawing/2010/main" Requires="a14">
+      <mc:AlternateContent xmlns:mc="http://schemas.openxmlformats.org/markup-compatibility/2006" xmlns:a14="http://schemas.microsoft.com/office/drawing/2010/main">
+        <mc:Choice Requires="a14">
           <p:sp>
             <p:nvSpPr>
               <p:cNvPr id="18" name="TextBox 17">
@@ -17125,7 +17081,7 @@
             </p:txBody>
           </p:sp>
         </mc:Choice>
-        <mc:Fallback>
+        <mc:Fallback xmlns="">
           <p:sp>
             <p:nvSpPr>
               <p:cNvPr id="18" name="TextBox 17">
@@ -18206,8 +18162,8 @@
           </a:p>
         </p:txBody>
       </p:sp>
-      <mc:AlternateContent xmlns:mc="http://schemas.openxmlformats.org/markup-compatibility/2006">
-        <mc:Choice xmlns:a14="http://schemas.microsoft.com/office/drawing/2010/main" Requires="a14">
+      <mc:AlternateContent xmlns:mc="http://schemas.openxmlformats.org/markup-compatibility/2006" xmlns:a14="http://schemas.microsoft.com/office/drawing/2010/main">
+        <mc:Choice Requires="a14">
           <p:sp>
             <p:nvSpPr>
               <p:cNvPr id="8" name="TextBox 7">
@@ -19163,7 +19119,7 @@
             </p:txBody>
           </p:sp>
         </mc:Choice>
-        <mc:Fallback>
+        <mc:Fallback xmlns="">
           <p:sp>
             <p:nvSpPr>
               <p:cNvPr id="8" name="TextBox 7">
@@ -19208,8 +19164,8 @@
           </p:sp>
         </mc:Fallback>
       </mc:AlternateContent>
-      <mc:AlternateContent xmlns:mc="http://schemas.openxmlformats.org/markup-compatibility/2006">
-        <mc:Choice xmlns:a14="http://schemas.microsoft.com/office/drawing/2010/main" Requires="a14">
+      <mc:AlternateContent xmlns:mc="http://schemas.openxmlformats.org/markup-compatibility/2006" xmlns:a14="http://schemas.microsoft.com/office/drawing/2010/main">
+        <mc:Choice Requires="a14">
           <p:sp>
             <p:nvSpPr>
               <p:cNvPr id="6" name="TextBox 5"/>
@@ -19640,7 +19596,7 @@
             </p:txBody>
           </p:sp>
         </mc:Choice>
-        <mc:Fallback>
+        <mc:Fallback xmlns="">
           <p:sp>
             <p:nvSpPr>
               <p:cNvPr id="6" name="TextBox 5"/>
@@ -27955,6 +27911,15 @@
 </file>
 
 <file path=customXml/item1.xml><?xml version="1.0" encoding="utf-8"?>
+<?mso-contentType ?>
+<FormTemplates xmlns="http://schemas.microsoft.com/sharepoint/v3/contenttype/forms">
+  <Display>DocumentLibraryForm</Display>
+  <Edit>DocumentLibraryForm</Edit>
+  <New>DocumentLibraryForm</New>
+</FormTemplates>
+</file>
+
+<file path=customXml/item2.xml><?xml version="1.0" encoding="utf-8"?>
 <ct:contentTypeSchema xmlns:ct="http://schemas.microsoft.com/office/2006/metadata/contentType" xmlns:ma="http://schemas.microsoft.com/office/2006/metadata/properties/metaAttributes" ct:_="" ma:_="" ma:contentTypeName="Document" ma:contentTypeID="0x010100683E31740070594596117FEC384DD67F" ma:contentTypeVersion="14" ma:contentTypeDescription="Create a new document." ma:contentTypeScope="" ma:versionID="c7648634e9df3405144b3fe5a1726d33">
   <xsd:schema xmlns:xsd="http://www.w3.org/2001/XMLSchema" xmlns:xs="http://www.w3.org/2001/XMLSchema" xmlns:p="http://schemas.microsoft.com/office/2006/metadata/properties" xmlns:ns1="http://schemas.microsoft.com/sharepoint/v3" xmlns:ns2="a1d3deca-49d0-46fa-a3f9-6e0c4e618558" xmlns:ns3="32a7ba11-dde9-4cf2-a6ac-8f31dc36ce67" targetNamespace="http://schemas.microsoft.com/office/2006/metadata/properties" ma:root="true" ma:fieldsID="3f4aaf3f81e128484679cd5afd72b81d" ns1:_="" ns2:_="" ns3:_="">
     <xsd:import namespace="http://schemas.microsoft.com/sharepoint/v3"/>
@@ -28213,7 +28178,21 @@
 </ct:contentTypeSchema>
 </file>
 
-<file path=customXml/item2.xml><?xml version="1.0" encoding="utf-8"?>
+<file path=customXml/item3.xml><?xml version="1.0" encoding="utf-8"?>
+<p:properties xmlns:p="http://schemas.microsoft.com/office/2006/metadata/properties" xmlns:xsi="http://www.w3.org/2001/XMLSchema-instance" xmlns:pc="http://schemas.microsoft.com/office/infopath/2007/PartnerControls">
+  <documentManagement>
+    <_ip_UnifiedCompliancePolicyUIAction xmlns="http://schemas.microsoft.com/sharepoint/v3" xsi:nil="true"/>
+    <_ip_UnifiedCompliancePolicyProperties xmlns="http://schemas.microsoft.com/sharepoint/v3" xsi:nil="true"/>
+    <_dlc_DocId xmlns="a1d3deca-49d0-46fa-a3f9-6e0c4e618558">XFNKNFZNA3JN-2102554853-552669</_dlc_DocId>
+    <_dlc_DocIdUrl xmlns="a1d3deca-49d0-46fa-a3f9-6e0c4e618558">
+      <Url>https://knime.sharepoint.com/_layouts/15/DocIdRedir.aspx?ID=XFNKNFZNA3JN-2102554853-552669</Url>
+      <Description>XFNKNFZNA3JN-2102554853-552669</Description>
+    </_dlc_DocIdUrl>
+  </documentManagement>
+</p:properties>
+</file>
+
+<file path=customXml/item4.xml><?xml version="1.0" encoding="utf-8"?>
 <?mso-contentType ?>
 <spe:Receivers xmlns:spe="http://schemas.microsoft.com/sharepoint/events">
   <Receiver>
@@ -28263,30 +28242,15 @@
 </spe:Receivers>
 </file>
 
-<file path=customXml/item3.xml><?xml version="1.0" encoding="utf-8"?>
-<?mso-contentType ?>
-<FormTemplates xmlns="http://schemas.microsoft.com/sharepoint/v3/contenttype/forms">
-  <Display>DocumentLibraryForm</Display>
-  <Edit>DocumentLibraryForm</Edit>
-  <New>DocumentLibraryForm</New>
-</FormTemplates>
+<file path=customXml/itemProps1.xml><?xml version="1.0" encoding="utf-8"?>
+<ds:datastoreItem xmlns:ds="http://schemas.openxmlformats.org/officeDocument/2006/customXml" ds:itemID="{DEC53D86-9493-45BF-B85E-0AA6C48C3EE3}">
+  <ds:schemaRefs>
+    <ds:schemaRef ds:uri="http://schemas.microsoft.com/sharepoint/v3/contenttype/forms"/>
+  </ds:schemaRefs>
+</ds:datastoreItem>
 </file>
 
-<file path=customXml/item4.xml><?xml version="1.0" encoding="utf-8"?>
-<p:properties xmlns:p="http://schemas.microsoft.com/office/2006/metadata/properties" xmlns:xsi="http://www.w3.org/2001/XMLSchema-instance" xmlns:pc="http://schemas.microsoft.com/office/infopath/2007/PartnerControls">
-  <documentManagement>
-    <_ip_UnifiedCompliancePolicyUIAction xmlns="http://schemas.microsoft.com/sharepoint/v3" xsi:nil="true"/>
-    <_ip_UnifiedCompliancePolicyProperties xmlns="http://schemas.microsoft.com/sharepoint/v3" xsi:nil="true"/>
-    <_dlc_DocId xmlns="a1d3deca-49d0-46fa-a3f9-6e0c4e618558">XFNKNFZNA3JN-2102554853-552669</_dlc_DocId>
-    <_dlc_DocIdUrl xmlns="a1d3deca-49d0-46fa-a3f9-6e0c4e618558">
-      <Url>https://knime.sharepoint.com/_layouts/15/DocIdRedir.aspx?ID=XFNKNFZNA3JN-2102554853-552669</Url>
-      <Description>XFNKNFZNA3JN-2102554853-552669</Description>
-    </_dlc_DocIdUrl>
-  </documentManagement>
-</p:properties>
-</file>
-
-<file path=customXml/itemProps1.xml><?xml version="1.0" encoding="utf-8"?>
+<file path=customXml/itemProps2.xml><?xml version="1.0" encoding="utf-8"?>
 <ds:datastoreItem xmlns:ds="http://schemas.openxmlformats.org/officeDocument/2006/customXml" ds:itemID="{2E3C1EC3-B818-47B8-9B0B-AD0746B5A7F9}">
   <ds:schemaRefs>
     <ds:schemaRef ds:uri="http://schemas.microsoft.com/office/2006/metadata/contentType"/>
@@ -28306,23 +28270,7 @@
 </ds:datastoreItem>
 </file>
 
-<file path=customXml/itemProps2.xml><?xml version="1.0" encoding="utf-8"?>
-<ds:datastoreItem xmlns:ds="http://schemas.openxmlformats.org/officeDocument/2006/customXml" ds:itemID="{9EB13A17-D620-458D-B254-A93728D7433C}">
-  <ds:schemaRefs>
-    <ds:schemaRef ds:uri="http://schemas.microsoft.com/sharepoint/events"/>
-  </ds:schemaRefs>
-</ds:datastoreItem>
-</file>
-
 <file path=customXml/itemProps3.xml><?xml version="1.0" encoding="utf-8"?>
-<ds:datastoreItem xmlns:ds="http://schemas.openxmlformats.org/officeDocument/2006/customXml" ds:itemID="{DEC53D86-9493-45BF-B85E-0AA6C48C3EE3}">
-  <ds:schemaRefs>
-    <ds:schemaRef ds:uri="http://schemas.microsoft.com/sharepoint/v3/contenttype/forms"/>
-  </ds:schemaRefs>
-</ds:datastoreItem>
-</file>
-
-<file path=customXml/itemProps4.xml><?xml version="1.0" encoding="utf-8"?>
 <ds:datastoreItem xmlns:ds="http://schemas.openxmlformats.org/officeDocument/2006/customXml" ds:itemID="{66BC03A6-CC7F-4A60-B738-FC353793CF8C}">
   <ds:schemaRefs>
     <ds:schemaRef ds:uri="http://purl.org/dc/dcmitype/"/>
@@ -28338,4 +28286,12 @@
     <ds:schemaRef ds:uri="http://purl.org/dc/terms/"/>
   </ds:schemaRefs>
 </ds:datastoreItem>
+</file>
+
+<file path=customXml/itemProps4.xml><?xml version="1.0" encoding="utf-8"?>
+<ds:datastoreItem xmlns:ds="http://schemas.openxmlformats.org/officeDocument/2006/customXml" ds:itemID="{9EB13A17-D620-458D-B254-A93728D7433C}">
+  <ds:schemaRefs>
+    <ds:schemaRef ds:uri="http://schemas.microsoft.com/sharepoint/events"/>
+  </ds:schemaRefs>
+</ds:datastoreItem>
 </file>
</xml_diff>